<commit_message>
updated 2018-04-01 (only first 15 pages)
</commit_message>
<xml_diff>
--- a/DynaLib2.pptx
+++ b/DynaLib2.pptx
@@ -2304,7 +2304,7 @@
                   <a:bodyPr/>
                   <a:lstStyle/>
                   <a:p>
-                    <a:fld id="{2A22D386-758D-4CBA-9B4C-2494C0076A52}" type="CELLRANGE">
+                    <a:fld id="{6B7CC21C-DAAC-440C-8363-B3BC9AA43F69}" type="CELLRANGE">
                       <a:rPr lang="ru-RU"/>
                       <a:pPr/>
                       <a:t>[ДИАПАЗОН ЯЧЕЕК]</a:t>
@@ -2338,7 +2338,7 @@
                   <a:bodyPr/>
                   <a:lstStyle/>
                   <a:p>
-                    <a:fld id="{61C09247-E3BE-407C-9AC0-7C893C399086}" type="CELLRANGE">
+                    <a:fld id="{D17A00DC-946C-4E93-9827-B7B8169D7AC4}" type="CELLRANGE">
                       <a:rPr lang="ru-RU"/>
                       <a:pPr/>
                       <a:t>[ДИАПАЗОН ЯЧЕЕК]</a:t>
@@ -2372,7 +2372,7 @@
                   <a:bodyPr/>
                   <a:lstStyle/>
                   <a:p>
-                    <a:fld id="{6C5FCD77-C8AC-41A6-9449-206AFA2D28E4}" type="CELLRANGE">
+                    <a:fld id="{E9BE08DE-0541-4EFC-AD76-C9447059B16D}" type="CELLRANGE">
                       <a:rPr lang="ru-RU"/>
                       <a:pPr/>
                       <a:t>[ДИАПАЗОН ЯЧЕЕК]</a:t>
@@ -2596,7 +2596,7 @@
                   <a:bodyPr/>
                   <a:lstStyle/>
                   <a:p>
-                    <a:fld id="{2696A86D-A96C-47CA-8A71-4F310B1F7AC3}" type="CELLRANGE">
+                    <a:fld id="{5DAF45F0-D6EC-4D19-91A3-AB78A6955024}" type="CELLRANGE">
                       <a:rPr lang="ru-RU"/>
                       <a:pPr/>
                       <a:t>[ДИАПАЗОН ЯЧЕЕК]</a:t>
@@ -2630,7 +2630,7 @@
                   <a:bodyPr/>
                   <a:lstStyle/>
                   <a:p>
-                    <a:fld id="{D9936D91-1994-4E66-A38D-8E450FDC00B9}" type="CELLRANGE">
+                    <a:fld id="{5D5A48B8-D016-4515-B14C-CC404A416945}" type="CELLRANGE">
                       <a:rPr lang="ru-RU"/>
                       <a:pPr/>
                       <a:t>[ДИАПАЗОН ЯЧЕЕК]</a:t>
@@ -2664,7 +2664,7 @@
                   <a:bodyPr/>
                   <a:lstStyle/>
                   <a:p>
-                    <a:fld id="{C93A23B0-12C4-4A31-B03A-D6318D6F4E94}" type="CELLRANGE">
+                    <a:fld id="{19F467C4-E480-4FE5-A153-5DE330B2B319}" type="CELLRANGE">
                       <a:rPr lang="ru-RU"/>
                       <a:pPr/>
                       <a:t>[ДИАПАЗОН ЯЧЕЕК]</a:t>
@@ -5842,7 +5842,7 @@
           <a:p>
             <a:fld id="{1928AD03-9F9E-416B-AE4D-D18A05A534F8}" type="datetimeFigureOut">
               <a:rPr lang="ru-RU" smtClean="0"/>
-              <a:t>31.03.2018</a:t>
+              <a:t>01.04.2018</a:t>
             </a:fld>
             <a:endParaRPr lang="ru-RU"/>
           </a:p>
@@ -6300,7 +6300,7 @@
           <a:p>
             <a:fld id="{F7D51D6B-DDA5-46A9-803B-1619190212B7}" type="datetime1">
               <a:rPr lang="en-US" smtClean="0"/>
-              <a:t>3/31/2018</a:t>
+              <a:t>4/1/2018</a:t>
             </a:fld>
             <a:endParaRPr lang="en-US" dirty="0"/>
           </a:p>
@@ -6732,7 +6732,7 @@
           <a:p>
             <a:fld id="{048A8183-7627-496A-B73E-8617600ED88E}" type="datetime1">
               <a:rPr lang="en-US" smtClean="0"/>
-              <a:t>3/31/2018</a:t>
+              <a:t>4/1/2018</a:t>
             </a:fld>
             <a:endParaRPr lang="en-US" dirty="0"/>
           </a:p>
@@ -6978,7 +6978,7 @@
           <a:p>
             <a:fld id="{5426ACFA-8403-4FFB-B533-A7691A70B530}" type="datetime1">
               <a:rPr lang="en-US" smtClean="0"/>
-              <a:t>3/31/2018</a:t>
+              <a:t>4/1/2018</a:t>
             </a:fld>
             <a:endParaRPr lang="en-US" dirty="0"/>
           </a:p>
@@ -7282,7 +7282,7 @@
           <a:p>
             <a:fld id="{6B92BA45-3202-47E5-B9A4-2029C8E4D937}" type="datetime1">
               <a:rPr lang="en-US" smtClean="0"/>
-              <a:t>3/31/2018</a:t>
+              <a:t>4/1/2018</a:t>
             </a:fld>
             <a:endParaRPr lang="en-US" dirty="0"/>
           </a:p>
@@ -7596,7 +7596,7 @@
           <a:p>
             <a:fld id="{7C2E5387-80F3-4916-B727-A485B1682D32}" type="datetime1">
               <a:rPr lang="en-US" smtClean="0"/>
-              <a:t>3/31/2018</a:t>
+              <a:t>4/1/2018</a:t>
             </a:fld>
             <a:endParaRPr lang="en-US" dirty="0"/>
           </a:p>
@@ -7894,7 +7894,7 @@
           <a:p>
             <a:fld id="{5A5985D6-719F-49B6-A866-10A72D20244C}" type="datetime1">
               <a:rPr lang="en-US" smtClean="0"/>
-              <a:t>3/31/2018</a:t>
+              <a:t>4/1/2018</a:t>
             </a:fld>
             <a:endParaRPr lang="en-US" dirty="0"/>
           </a:p>
@@ -8257,7 +8257,7 @@
           <a:p>
             <a:fld id="{9BEF2539-8350-40BF-801E-C1E977139A6B}" type="datetime1">
               <a:rPr lang="en-US" smtClean="0"/>
-              <a:t>3/31/2018</a:t>
+              <a:t>4/1/2018</a:t>
             </a:fld>
             <a:endParaRPr lang="en-US" dirty="0"/>
           </a:p>
@@ -8427,7 +8427,7 @@
           <a:p>
             <a:fld id="{AFC2471F-D97B-41E3-B476-5177C9D0C522}" type="datetime1">
               <a:rPr lang="en-US" smtClean="0"/>
-              <a:t>3/31/2018</a:t>
+              <a:t>4/1/2018</a:t>
             </a:fld>
             <a:endParaRPr lang="en-US" dirty="0"/>
           </a:p>
@@ -8603,7 +8603,7 @@
           <a:p>
             <a:fld id="{ED06A3D7-E2A0-435F-A2BF-6C3BB7EEC3E4}" type="datetime1">
               <a:rPr lang="en-US" smtClean="0"/>
-              <a:t>3/31/2018</a:t>
+              <a:t>4/1/2018</a:t>
             </a:fld>
             <a:endParaRPr lang="en-US" dirty="0"/>
           </a:p>
@@ -8769,7 +8769,7 @@
           <a:p>
             <a:fld id="{1F594F6B-6010-455F-92BE-DADCA4C88D32}" type="datetime1">
               <a:rPr lang="en-US" smtClean="0"/>
-              <a:t>3/31/2018</a:t>
+              <a:t>4/1/2018</a:t>
             </a:fld>
             <a:endParaRPr lang="en-US" dirty="0"/>
           </a:p>
@@ -9015,7 +9015,7 @@
           <a:p>
             <a:fld id="{A2264A0C-9DED-4D85-A58F-584690C2C0DA}" type="datetime1">
               <a:rPr lang="en-US" smtClean="0"/>
-              <a:t>3/31/2018</a:t>
+              <a:t>4/1/2018</a:t>
             </a:fld>
             <a:endParaRPr lang="en-US" dirty="0"/>
           </a:p>
@@ -9247,7 +9247,7 @@
           <a:p>
             <a:fld id="{1213D818-5694-4BC9-A7C8-37D3BAFA8D3A}" type="datetime1">
               <a:rPr lang="en-US" smtClean="0"/>
-              <a:t>3/31/2018</a:t>
+              <a:t>4/1/2018</a:t>
             </a:fld>
             <a:endParaRPr lang="en-US" dirty="0"/>
           </a:p>
@@ -9625,7 +9625,7 @@
           <a:p>
             <a:fld id="{9D4DA761-8DF3-42ED-A5F4-C5E38643DC27}" type="datetime1">
               <a:rPr lang="en-US" smtClean="0"/>
-              <a:t>3/31/2018</a:t>
+              <a:t>4/1/2018</a:t>
             </a:fld>
             <a:endParaRPr lang="en-US" dirty="0"/>
           </a:p>
@@ -9739,7 +9739,7 @@
           <a:p>
             <a:fld id="{71448DCC-8438-489F-9492-955EAEEA3F62}" type="datetime1">
               <a:rPr lang="en-US" smtClean="0"/>
-              <a:t>3/31/2018</a:t>
+              <a:t>4/1/2018</a:t>
             </a:fld>
             <a:endParaRPr lang="en-US" dirty="0"/>
           </a:p>
@@ -9830,7 +9830,7 @@
           <a:p>
             <a:fld id="{DB7B5B79-64AF-4B2E-800A-AE933CB92D6A}" type="datetime1">
               <a:rPr lang="en-US" smtClean="0"/>
-              <a:t>3/31/2018</a:t>
+              <a:t>4/1/2018</a:t>
             </a:fld>
             <a:endParaRPr lang="en-US" dirty="0"/>
           </a:p>
@@ -10081,7 +10081,7 @@
           <a:p>
             <a:fld id="{5A573AAF-D586-4BC3-87F1-9343D9B5135C}" type="datetime1">
               <a:rPr lang="en-US" smtClean="0"/>
-              <a:t>3/31/2018</a:t>
+              <a:t>4/1/2018</a:t>
             </a:fld>
             <a:endParaRPr lang="en-US" dirty="0"/>
           </a:p>
@@ -10360,7 +10360,7 @@
           <a:p>
             <a:fld id="{920C250D-E9C9-41DD-B4D1-DF2893F5B3E7}" type="datetime1">
               <a:rPr lang="en-US" smtClean="0"/>
-              <a:t>3/31/2018</a:t>
+              <a:t>4/1/2018</a:t>
             </a:fld>
             <a:endParaRPr lang="en-US" dirty="0"/>
           </a:p>
@@ -10762,7 +10762,7 @@
           <a:p>
             <a:fld id="{6618231D-3D2B-47EE-ADFA-D4290631BBEC}" type="datetime1">
               <a:rPr lang="en-US" smtClean="0"/>
-              <a:t>3/31/2018</a:t>
+              <a:t>4/1/2018</a:t>
             </a:fld>
             <a:endParaRPr lang="en-US" dirty="0"/>
           </a:p>
@@ -37820,8 +37820,8 @@
         </p:nvSpPr>
         <p:spPr>
           <a:xfrm>
-            <a:off x="3450673" y="934415"/>
-            <a:ext cx="5182998" cy="1738310"/>
+            <a:off x="3450673" y="810306"/>
+            <a:ext cx="5182998" cy="1862419"/>
           </a:xfrm>
           <a:prstGeom prst="roundRect">
             <a:avLst/>
@@ -37971,6 +37971,48 @@
                 <a:cs typeface="Courier New" panose="02070309020205020404" pitchFamily="49" charset="0"/>
               </a:rPr>
               <a:t>заголовок</a:t>
+            </a:r>
+          </a:p>
+          <a:p>
+            <a:r>
+              <a:rPr lang="en-US" dirty="0">
+                <a:solidFill>
+                  <a:schemeClr val="bg1"/>
+                </a:solidFill>
+                <a:latin typeface="Courier New" panose="02070309020205020404" pitchFamily="49" charset="0"/>
+                <a:cs typeface="Courier New" panose="02070309020205020404" pitchFamily="49" charset="0"/>
+              </a:rPr>
+              <a:t>String	</a:t>
+            </a:r>
+            <a:r>
+              <a:rPr lang="en-US" b="1" dirty="0" err="1">
+                <a:solidFill>
+                  <a:schemeClr val="bg1"/>
+                </a:solidFill>
+                <a:latin typeface="Courier New" panose="02070309020205020404" pitchFamily="49" charset="0"/>
+                <a:cs typeface="Courier New" panose="02070309020205020404" pitchFamily="49" charset="0"/>
+              </a:rPr>
+              <a:t>Fld_Dict</a:t>
+            </a:r>
+            <a:r>
+              <a:rPr lang="en-US" dirty="0">
+                <a:solidFill>
+                  <a:schemeClr val="bg1"/>
+                </a:solidFill>
+                <a:latin typeface="Courier New" panose="02070309020205020404" pitchFamily="49" charset="0"/>
+                <a:cs typeface="Courier New" panose="02070309020205020404" pitchFamily="49" charset="0"/>
+              </a:rPr>
+              <a:t>	</a:t>
+            </a:r>
+            <a:r>
+              <a:rPr lang="ru-RU" dirty="0">
+                <a:solidFill>
+                  <a:schemeClr val="bg1"/>
+                </a:solidFill>
+                <a:latin typeface="Courier New" panose="02070309020205020404" pitchFamily="49" charset="0"/>
+                <a:cs typeface="Courier New" panose="02070309020205020404" pitchFamily="49" charset="0"/>
+              </a:rPr>
+              <a:t>описание полей</a:t>
             </a:r>
           </a:p>
         </p:txBody>
@@ -38517,14 +38559,13 @@
           </p:cNvPr>
           <p:cNvCxnSpPr>
             <a:cxnSpLocks/>
-            <a:stCxn id="2" idx="1"/>
           </p:cNvCxnSpPr>
           <p:nvPr/>
         </p:nvCxnSpPr>
         <p:spPr>
           <a:xfrm flipH="1">
-            <a:off x="2833165" y="1803570"/>
-            <a:ext cx="617508" cy="1749"/>
+            <a:off x="2910980" y="2122415"/>
+            <a:ext cx="539693" cy="0"/>
           </a:xfrm>
           <a:prstGeom prst="line">
             <a:avLst/>
@@ -38566,8 +38607,8 @@
         </p:nvCxnSpPr>
         <p:spPr>
           <a:xfrm>
-            <a:off x="2831328" y="1803570"/>
-            <a:ext cx="79652" cy="1862419"/>
+            <a:off x="2910980" y="2122415"/>
+            <a:ext cx="0" cy="1535185"/>
           </a:xfrm>
           <a:prstGeom prst="line">
             <a:avLst/>
@@ -38749,31 +38790,38 @@
           <p:nvPr>
             <p:extLst>
               <p:ext uri="{D42A27DB-BD31-4B8C-83A1-F6EECF244321}">
-                <p14:modId xmlns:p14="http://schemas.microsoft.com/office/powerpoint/2010/main" val="3870376242"/>
+                <p14:modId xmlns:p14="http://schemas.microsoft.com/office/powerpoint/2010/main" val="3682022375"/>
               </p:ext>
             </p:extLst>
           </p:nvPr>
         </p:nvGraphicFramePr>
         <p:xfrm>
-          <a:off x="465219" y="1877975"/>
-          <a:ext cx="5788920" cy="1061085"/>
+          <a:off x="478172" y="1877975"/>
+          <a:ext cx="7620176" cy="2615565"/>
         </p:xfrm>
         <a:graphic>
           <a:graphicData uri="http://schemas.openxmlformats.org/drawingml/2006/table">
             <a:tbl>
               <a:tblPr/>
               <a:tblGrid>
-                <a:gridCol w="1993191">
+                <a:gridCol w="1955160">
                   <a:extLst>
                     <a:ext uri="{9D8B030D-6E8A-4147-A177-3AD203B41FA5}">
                       <a16:colId xmlns:a16="http://schemas.microsoft.com/office/drawing/2014/main" val="3515466110"/>
                     </a:ext>
                   </a:extLst>
                 </a:gridCol>
-                <a:gridCol w="3795729">
+                <a:gridCol w="3430573">
                   <a:extLst>
                     <a:ext uri="{9D8B030D-6E8A-4147-A177-3AD203B41FA5}">
                       <a16:colId xmlns:a16="http://schemas.microsoft.com/office/drawing/2014/main" val="2699222735"/>
+                    </a:ext>
+                  </a:extLst>
+                </a:gridCol>
+                <a:gridCol w="2234443">
+                  <a:extLst>
+                    <a:ext uri="{9D8B030D-6E8A-4147-A177-3AD203B41FA5}">
+                      <a16:colId xmlns:a16="http://schemas.microsoft.com/office/drawing/2014/main" val="2362975315"/>
                     </a:ext>
                   </a:extLst>
                 </a:gridCol>
@@ -38906,92 +38954,32 @@
                     </a:solidFill>
                   </a:tcPr>
                 </a:tc>
-                <a:extLst>
-                  <a:ext uri="{0D108BD9-81ED-4DB2-BD59-A6C34878D82A}">
-                    <a16:rowId xmlns:a16="http://schemas.microsoft.com/office/drawing/2014/main" val="1307816390"/>
-                  </a:ext>
-                </a:extLst>
-              </a:tr>
-              <a:tr h="302186">
                 <a:tc>
                   <a:txBody>
                     <a:bodyPr/>
                     <a:lstStyle/>
                     <a:p>
-                      <a:pPr algn="l" fontAlgn="ctr"/>
+                      <a:pPr algn="ctr" fontAlgn="ctr"/>
                       <a:r>
-                        <a:rPr lang="en-US" sz="1800" b="0" i="0" u="none" strike="noStrike" dirty="0">
+                        <a:rPr lang="en-US" sz="1800" b="1" i="0" u="none" strike="noStrike" dirty="0" err="1">
                           <a:solidFill>
                             <a:srgbClr val="24292E"/>
                           </a:solidFill>
                           <a:effectLst/>
                           <a:latin typeface="Segoe UI" panose="020B0502040204020203" pitchFamily="34" charset="0"/>
                         </a:rPr>
-                        <a:t>Invoice</a:t>
+                        <a:t>Fld_Dict</a:t>
                       </a:r>
+                      <a:endParaRPr lang="en-US" sz="1800" b="1" i="0" u="none" strike="noStrike" dirty="0">
+                        <a:solidFill>
+                          <a:srgbClr val="24292E"/>
+                        </a:solidFill>
+                        <a:effectLst/>
+                        <a:latin typeface="Segoe UI" panose="020B0502040204020203" pitchFamily="34" charset="0"/>
+                      </a:endParaRPr>
                     </a:p>
                   </a:txBody>
-                  <a:tcPr marL="85725" marR="9525" marT="57150" marB="57150" anchor="ctr">
-                    <a:lnL w="12700" cap="flat" cmpd="sng" algn="ctr">
-                      <a:solidFill>
-                        <a:srgbClr val="DFE2E5"/>
-                      </a:solidFill>
-                      <a:prstDash val="solid"/>
-                      <a:round/>
-                      <a:headEnd type="none" w="med" len="med"/>
-                      <a:tailEnd type="none" w="med" len="med"/>
-                    </a:lnL>
-                    <a:lnR w="12700" cap="flat" cmpd="sng" algn="ctr">
-                      <a:solidFill>
-                        <a:srgbClr val="DFE2E5"/>
-                      </a:solidFill>
-                      <a:prstDash val="solid"/>
-                      <a:round/>
-                      <a:headEnd type="none" w="med" len="med"/>
-                      <a:tailEnd type="none" w="med" len="med"/>
-                    </a:lnR>
-                    <a:lnT w="12700" cap="flat" cmpd="sng" algn="ctr">
-                      <a:solidFill>
-                        <a:srgbClr val="DFE2E5"/>
-                      </a:solidFill>
-                      <a:prstDash val="solid"/>
-                      <a:round/>
-                      <a:headEnd type="none" w="med" len="med"/>
-                      <a:tailEnd type="none" w="med" len="med"/>
-                    </a:lnT>
-                    <a:lnB w="12700" cap="flat" cmpd="sng" algn="ctr">
-                      <a:solidFill>
-                        <a:srgbClr val="DFE2E5"/>
-                      </a:solidFill>
-                      <a:prstDash val="solid"/>
-                      <a:round/>
-                      <a:headEnd type="none" w="med" len="med"/>
-                      <a:tailEnd type="none" w="med" len="med"/>
-                    </a:lnB>
-                    <a:solidFill>
-                      <a:srgbClr val="FFFFFF"/>
-                    </a:solidFill>
-                  </a:tcPr>
-                </a:tc>
-                <a:tc>
-                  <a:txBody>
-                    <a:bodyPr/>
-                    <a:lstStyle/>
-                    <a:p>
-                      <a:pPr algn="l" fontAlgn="ctr"/>
-                      <a:r>
-                        <a:rPr lang="ru-RU" sz="1800" b="0" i="0" u="none" strike="noStrike">
-                          <a:solidFill>
-                            <a:srgbClr val="24292E"/>
-                          </a:solidFill>
-                          <a:effectLst/>
-                          <a:latin typeface="Segoe UI" panose="020B0502040204020203" pitchFamily="34" charset="0"/>
-                        </a:rPr>
-                        <a:t>Счета</a:t>
-                      </a:r>
-                    </a:p>
-                  </a:txBody>
-                  <a:tcPr marL="85725" marR="9525" marT="57150" marB="57150" anchor="ctr">
+                  <a:tcPr marL="9525" marR="9525" marT="9525" marB="0" anchor="ctr">
                     <a:lnL w="12700" cap="flat" cmpd="sng" algn="ctr">
                       <a:solidFill>
                         <a:srgbClr val="DFE2E5"/>
@@ -39035,7 +39023,7 @@
                 </a:tc>
                 <a:extLst>
                   <a:ext uri="{0D108BD9-81ED-4DB2-BD59-A6C34878D82A}">
-                    <a16:rowId xmlns:a16="http://schemas.microsoft.com/office/drawing/2014/main" val="56109863"/>
+                    <a16:rowId xmlns:a16="http://schemas.microsoft.com/office/drawing/2014/main" val="1307816390"/>
                   </a:ext>
                 </a:extLst>
               </a:tr>
@@ -39103,6 +39091,240 @@
                       <a:tailEnd type="none" w="med" len="med"/>
                     </a:lnB>
                     <a:solidFill>
+                      <a:srgbClr val="FFFFFF"/>
+                    </a:solidFill>
+                  </a:tcPr>
+                </a:tc>
+                <a:tc>
+                  <a:txBody>
+                    <a:bodyPr/>
+                    <a:lstStyle/>
+                    <a:p>
+                      <a:pPr algn="l" fontAlgn="ctr"/>
+                      <a:r>
+                        <a:rPr lang="ru-RU" sz="1800" b="0" i="0" u="none" strike="noStrike" dirty="0">
+                          <a:solidFill>
+                            <a:srgbClr val="24292E"/>
+                          </a:solidFill>
+                          <a:effectLst/>
+                          <a:latin typeface="Segoe UI" panose="020B0502040204020203" pitchFamily="34" charset="0"/>
+                        </a:rPr>
+                        <a:t>Счета</a:t>
+                      </a:r>
+                      <a:r>
+                        <a:rPr lang="en-US" sz="1800" b="0" i="0" u="none" strike="noStrike" dirty="0">
+                          <a:solidFill>
+                            <a:srgbClr val="24292E"/>
+                          </a:solidFill>
+                          <a:effectLst/>
+                          <a:latin typeface="Segoe UI" panose="020B0502040204020203" pitchFamily="34" charset="0"/>
+                        </a:rPr>
+                        <a:t> </a:t>
+                      </a:r>
+                      <a:r>
+                        <a:rPr lang="ru-RU" sz="1800" b="0" i="0" u="none" strike="noStrike" dirty="0">
+                          <a:solidFill>
+                            <a:srgbClr val="24292E"/>
+                          </a:solidFill>
+                          <a:effectLst/>
+                          <a:latin typeface="Segoe UI" panose="020B0502040204020203" pitchFamily="34" charset="0"/>
+                        </a:rPr>
+                        <a:t>(поле</a:t>
+                      </a:r>
+                      <a:r>
+                        <a:rPr lang="en-US" sz="1800" b="0" i="0" u="none" strike="noStrike" dirty="0">
+                          <a:solidFill>
+                            <a:srgbClr val="24292E"/>
+                          </a:solidFill>
+                          <a:effectLst/>
+                          <a:latin typeface="Segoe UI" panose="020B0502040204020203" pitchFamily="34" charset="0"/>
+                        </a:rPr>
+                        <a:t> Note - Text</a:t>
+                      </a:r>
+                      <a:r>
+                        <a:rPr lang="ru-RU" sz="1800" b="0" i="0" u="none" strike="noStrike" dirty="0">
+                          <a:solidFill>
+                            <a:srgbClr val="24292E"/>
+                          </a:solidFill>
+                          <a:effectLst/>
+                          <a:latin typeface="Segoe UI" panose="020B0502040204020203" pitchFamily="34" charset="0"/>
+                        </a:rPr>
+                        <a:t>)</a:t>
+                      </a:r>
+                    </a:p>
+                  </a:txBody>
+                  <a:tcPr marL="85725" marR="9525" marT="57150" marB="57150" anchor="ctr">
+                    <a:lnL w="12700" cap="flat" cmpd="sng" algn="ctr">
+                      <a:solidFill>
+                        <a:srgbClr val="DFE2E5"/>
+                      </a:solidFill>
+                      <a:prstDash val="solid"/>
+                      <a:round/>
+                      <a:headEnd type="none" w="med" len="med"/>
+                      <a:tailEnd type="none" w="med" len="med"/>
+                    </a:lnL>
+                    <a:lnR w="12700" cap="flat" cmpd="sng" algn="ctr">
+                      <a:solidFill>
+                        <a:srgbClr val="DFE2E5"/>
+                      </a:solidFill>
+                      <a:prstDash val="solid"/>
+                      <a:round/>
+                      <a:headEnd type="none" w="med" len="med"/>
+                      <a:tailEnd type="none" w="med" len="med"/>
+                    </a:lnR>
+                    <a:lnT w="12700" cap="flat" cmpd="sng" algn="ctr">
+                      <a:solidFill>
+                        <a:srgbClr val="DFE2E5"/>
+                      </a:solidFill>
+                      <a:prstDash val="solid"/>
+                      <a:round/>
+                      <a:headEnd type="none" w="med" len="med"/>
+                      <a:tailEnd type="none" w="med" len="med"/>
+                    </a:lnT>
+                    <a:lnB w="12700" cap="flat" cmpd="sng" algn="ctr">
+                      <a:solidFill>
+                        <a:srgbClr val="DFE2E5"/>
+                      </a:solidFill>
+                      <a:prstDash val="solid"/>
+                      <a:round/>
+                      <a:headEnd type="none" w="med" len="med"/>
+                      <a:tailEnd type="none" w="med" len="med"/>
+                    </a:lnB>
+                    <a:solidFill>
+                      <a:srgbClr val="FFFFFF"/>
+                    </a:solidFill>
+                  </a:tcPr>
+                </a:tc>
+                <a:tc>
+                  <a:txBody>
+                    <a:bodyPr/>
+                    <a:lstStyle/>
+                    <a:p>
+                      <a:pPr algn="l" fontAlgn="ctr"/>
+                      <a:r>
+                        <a:rPr lang="en-US" sz="1800" b="0" i="0" u="none" strike="noStrike" dirty="0" err="1">
+                          <a:solidFill>
+                            <a:srgbClr val="24292E"/>
+                          </a:solidFill>
+                          <a:effectLst/>
+                          <a:latin typeface="Segoe UI" panose="020B0502040204020203" pitchFamily="34" charset="0"/>
+                        </a:rPr>
+                        <a:t>Invo</a:t>
+                      </a:r>
+                      <a:endParaRPr lang="ru-RU" sz="1800" b="0" i="0" u="none" strike="noStrike" dirty="0">
+                        <a:solidFill>
+                          <a:srgbClr val="24292E"/>
+                        </a:solidFill>
+                        <a:effectLst/>
+                        <a:latin typeface="Segoe UI" panose="020B0502040204020203" pitchFamily="34" charset="0"/>
+                      </a:endParaRPr>
+                    </a:p>
+                  </a:txBody>
+                  <a:tcPr marL="85725" marR="9525" marT="57150" marB="57150" anchor="ctr">
+                    <a:lnL w="12700" cap="flat" cmpd="sng" algn="ctr">
+                      <a:solidFill>
+                        <a:srgbClr val="DFE2E5"/>
+                      </a:solidFill>
+                      <a:prstDash val="solid"/>
+                      <a:round/>
+                      <a:headEnd type="none" w="med" len="med"/>
+                      <a:tailEnd type="none" w="med" len="med"/>
+                    </a:lnL>
+                    <a:lnR w="12700" cap="flat" cmpd="sng" algn="ctr">
+                      <a:solidFill>
+                        <a:srgbClr val="DFE2E5"/>
+                      </a:solidFill>
+                      <a:prstDash val="solid"/>
+                      <a:round/>
+                      <a:headEnd type="none" w="med" len="med"/>
+                      <a:tailEnd type="none" w="med" len="med"/>
+                    </a:lnR>
+                    <a:lnT w="12700" cap="flat" cmpd="sng" algn="ctr">
+                      <a:solidFill>
+                        <a:srgbClr val="DFE2E5"/>
+                      </a:solidFill>
+                      <a:prstDash val="solid"/>
+                      <a:round/>
+                      <a:headEnd type="none" w="med" len="med"/>
+                      <a:tailEnd type="none" w="med" len="med"/>
+                    </a:lnT>
+                    <a:lnB w="12700" cap="flat" cmpd="sng" algn="ctr">
+                      <a:solidFill>
+                        <a:srgbClr val="DFE2E5"/>
+                      </a:solidFill>
+                      <a:prstDash val="solid"/>
+                      <a:round/>
+                      <a:headEnd type="none" w="med" len="med"/>
+                      <a:tailEnd type="none" w="med" len="med"/>
+                    </a:lnB>
+                    <a:solidFill>
+                      <a:srgbClr val="FFFFFF"/>
+                    </a:solidFill>
+                  </a:tcPr>
+                </a:tc>
+                <a:extLst>
+                  <a:ext uri="{0D108BD9-81ED-4DB2-BD59-A6C34878D82A}">
+                    <a16:rowId xmlns:a16="http://schemas.microsoft.com/office/drawing/2014/main" val="56109863"/>
+                  </a:ext>
+                </a:extLst>
+              </a:tr>
+              <a:tr h="302186">
+                <a:tc>
+                  <a:txBody>
+                    <a:bodyPr/>
+                    <a:lstStyle/>
+                    <a:p>
+                      <a:pPr algn="l" fontAlgn="ctr"/>
+                      <a:r>
+                        <a:rPr lang="en-US" sz="1800" b="0" i="0" u="none" strike="noStrike" dirty="0">
+                          <a:solidFill>
+                            <a:srgbClr val="24292E"/>
+                          </a:solidFill>
+                          <a:effectLst/>
+                          <a:latin typeface="Segoe UI" panose="020B0502040204020203" pitchFamily="34" charset="0"/>
+                        </a:rPr>
+                        <a:t>Invoice</a:t>
+                      </a:r>
+                    </a:p>
+                  </a:txBody>
+                  <a:tcPr marL="85725" marR="9525" marT="57150" marB="57150" anchor="ctr">
+                    <a:lnL w="12700" cap="flat" cmpd="sng" algn="ctr">
+                      <a:solidFill>
+                        <a:srgbClr val="DFE2E5"/>
+                      </a:solidFill>
+                      <a:prstDash val="solid"/>
+                      <a:round/>
+                      <a:headEnd type="none" w="med" len="med"/>
+                      <a:tailEnd type="none" w="med" len="med"/>
+                    </a:lnL>
+                    <a:lnR w="12700" cap="flat" cmpd="sng" algn="ctr">
+                      <a:solidFill>
+                        <a:srgbClr val="DFE2E5"/>
+                      </a:solidFill>
+                      <a:prstDash val="solid"/>
+                      <a:round/>
+                      <a:headEnd type="none" w="med" len="med"/>
+                      <a:tailEnd type="none" w="med" len="med"/>
+                    </a:lnR>
+                    <a:lnT w="12700" cap="flat" cmpd="sng" algn="ctr">
+                      <a:solidFill>
+                        <a:srgbClr val="DFE2E5"/>
+                      </a:solidFill>
+                      <a:prstDash val="solid"/>
+                      <a:round/>
+                      <a:headEnd type="none" w="med" len="med"/>
+                      <a:tailEnd type="none" w="med" len="med"/>
+                    </a:lnT>
+                    <a:lnB w="12700" cap="flat" cmpd="sng" algn="ctr">
+                      <a:solidFill>
+                        <a:srgbClr val="DFE2E5"/>
+                      </a:solidFill>
+                      <a:prstDash val="solid"/>
+                      <a:round/>
+                      <a:headEnd type="none" w="med" len="med"/>
+                      <a:tailEnd type="none" w="med" len="med"/>
+                    </a:lnB>
+                    <a:solidFill>
                       <a:srgbClr val="F6F8FA"/>
                     </a:solidFill>
                   </a:tcPr>
@@ -39113,6 +39335,223 @@
                     <a:lstStyle/>
                     <a:p>
                       <a:pPr algn="l" fontAlgn="ctr"/>
+                      <a:r>
+                        <a:rPr lang="ru-RU" sz="1800" b="0" i="0" u="none" strike="noStrike" dirty="0">
+                          <a:solidFill>
+                            <a:srgbClr val="24292E"/>
+                          </a:solidFill>
+                          <a:effectLst/>
+                          <a:latin typeface="Segoe UI" panose="020B0502040204020203" pitchFamily="34" charset="0"/>
+                        </a:rPr>
+                        <a:t>Счета</a:t>
+                      </a:r>
+                    </a:p>
+                  </a:txBody>
+                  <a:tcPr marL="85725" marR="9525" marT="57150" marB="57150" anchor="ctr">
+                    <a:lnL w="12700" cap="flat" cmpd="sng" algn="ctr">
+                      <a:solidFill>
+                        <a:srgbClr val="DFE2E5"/>
+                      </a:solidFill>
+                      <a:prstDash val="solid"/>
+                      <a:round/>
+                      <a:headEnd type="none" w="med" len="med"/>
+                      <a:tailEnd type="none" w="med" len="med"/>
+                    </a:lnL>
+                    <a:lnR w="12700" cap="flat" cmpd="sng" algn="ctr">
+                      <a:solidFill>
+                        <a:srgbClr val="DFE2E5"/>
+                      </a:solidFill>
+                      <a:prstDash val="solid"/>
+                      <a:round/>
+                      <a:headEnd type="none" w="med" len="med"/>
+                      <a:tailEnd type="none" w="med" len="med"/>
+                    </a:lnR>
+                    <a:lnT w="12700" cap="flat" cmpd="sng" algn="ctr">
+                      <a:solidFill>
+                        <a:srgbClr val="DFE2E5"/>
+                      </a:solidFill>
+                      <a:prstDash val="solid"/>
+                      <a:round/>
+                      <a:headEnd type="none" w="med" len="med"/>
+                      <a:tailEnd type="none" w="med" len="med"/>
+                    </a:lnT>
+                    <a:lnB w="12700" cap="flat" cmpd="sng" algn="ctr">
+                      <a:solidFill>
+                        <a:srgbClr val="DFE2E5"/>
+                      </a:solidFill>
+                      <a:prstDash val="solid"/>
+                      <a:round/>
+                      <a:headEnd type="none" w="med" len="med"/>
+                      <a:tailEnd type="none" w="med" len="med"/>
+                    </a:lnB>
+                    <a:solidFill>
+                      <a:srgbClr val="F6F8FA"/>
+                    </a:solidFill>
+                  </a:tcPr>
+                </a:tc>
+                <a:tc>
+                  <a:txBody>
+                    <a:bodyPr/>
+                    <a:lstStyle/>
+                    <a:p>
+                      <a:pPr algn="l" fontAlgn="ctr"/>
+                      <a:r>
+                        <a:rPr lang="en-US" sz="1800" b="0" i="0" u="none" strike="noStrike" dirty="0">
+                          <a:solidFill>
+                            <a:srgbClr val="24292E"/>
+                          </a:solidFill>
+                          <a:effectLst/>
+                          <a:latin typeface="Segoe UI" panose="020B0502040204020203" pitchFamily="34" charset="0"/>
+                        </a:rPr>
+                        <a:t>Invoice</a:t>
+                      </a:r>
+                      <a:endParaRPr lang="ru-RU" sz="1800" b="0" i="0" u="none" strike="noStrike" dirty="0">
+                        <a:solidFill>
+                          <a:srgbClr val="24292E"/>
+                        </a:solidFill>
+                        <a:effectLst/>
+                        <a:latin typeface="Segoe UI" panose="020B0502040204020203" pitchFamily="34" charset="0"/>
+                      </a:endParaRPr>
+                    </a:p>
+                  </a:txBody>
+                  <a:tcPr marL="85725" marR="9525" marT="57150" marB="57150" anchor="ctr">
+                    <a:lnL w="12700" cap="flat" cmpd="sng" algn="ctr">
+                      <a:solidFill>
+                        <a:srgbClr val="DFE2E5"/>
+                      </a:solidFill>
+                      <a:prstDash val="solid"/>
+                      <a:round/>
+                      <a:headEnd type="none" w="med" len="med"/>
+                      <a:tailEnd type="none" w="med" len="med"/>
+                    </a:lnL>
+                    <a:lnR w="12700" cap="flat" cmpd="sng" algn="ctr">
+                      <a:solidFill>
+                        <a:srgbClr val="DFE2E5"/>
+                      </a:solidFill>
+                      <a:prstDash val="solid"/>
+                      <a:round/>
+                      <a:headEnd type="none" w="med" len="med"/>
+                      <a:tailEnd type="none" w="med" len="med"/>
+                    </a:lnR>
+                    <a:lnT w="12700" cap="flat" cmpd="sng" algn="ctr">
+                      <a:solidFill>
+                        <a:srgbClr val="DFE2E5"/>
+                      </a:solidFill>
+                      <a:prstDash val="solid"/>
+                      <a:round/>
+                      <a:headEnd type="none" w="med" len="med"/>
+                      <a:tailEnd type="none" w="med" len="med"/>
+                    </a:lnT>
+                    <a:lnB w="12700" cap="flat" cmpd="sng" algn="ctr">
+                      <a:solidFill>
+                        <a:srgbClr val="DFE2E5"/>
+                      </a:solidFill>
+                      <a:prstDash val="solid"/>
+                      <a:round/>
+                      <a:headEnd type="none" w="med" len="med"/>
+                      <a:tailEnd type="none" w="med" len="med"/>
+                    </a:lnB>
+                    <a:solidFill>
+                      <a:srgbClr val="F6F8FA"/>
+                    </a:solidFill>
+                  </a:tcPr>
+                </a:tc>
+                <a:extLst>
+                  <a:ext uri="{0D108BD9-81ED-4DB2-BD59-A6C34878D82A}">
+                    <a16:rowId xmlns:a16="http://schemas.microsoft.com/office/drawing/2014/main" val="1787466719"/>
+                  </a:ext>
+                </a:extLst>
+              </a:tr>
+              <a:tr h="302186">
+                <a:tc>
+                  <a:txBody>
+                    <a:bodyPr/>
+                    <a:lstStyle/>
+                    <a:p>
+                      <a:pPr algn="l" fontAlgn="ctr"/>
+                      <a:r>
+                        <a:rPr lang="en-US" sz="1800" b="0" i="0" u="none" strike="noStrike" dirty="0" err="1">
+                          <a:solidFill>
+                            <a:srgbClr val="24292E"/>
+                          </a:solidFill>
+                          <a:effectLst/>
+                          <a:latin typeface="Segoe UI" panose="020B0502040204020203" pitchFamily="34" charset="0"/>
+                        </a:rPr>
+                        <a:t>InvoCut</a:t>
+                      </a:r>
+                      <a:endParaRPr lang="en-US" sz="1800" b="0" i="0" u="none" strike="noStrike" dirty="0">
+                        <a:solidFill>
+                          <a:srgbClr val="24292E"/>
+                        </a:solidFill>
+                        <a:effectLst/>
+                        <a:latin typeface="Segoe UI" panose="020B0502040204020203" pitchFamily="34" charset="0"/>
+                      </a:endParaRPr>
+                    </a:p>
+                  </a:txBody>
+                  <a:tcPr marL="85725" marR="9525" marT="57150" marB="57150" anchor="ctr">
+                    <a:lnL w="12700" cap="flat" cmpd="sng" algn="ctr">
+                      <a:solidFill>
+                        <a:srgbClr val="DFE2E5"/>
+                      </a:solidFill>
+                      <a:prstDash val="solid"/>
+                      <a:round/>
+                      <a:headEnd type="none" w="med" len="med"/>
+                      <a:tailEnd type="none" w="med" len="med"/>
+                    </a:lnL>
+                    <a:lnR w="12700" cap="flat" cmpd="sng" algn="ctr">
+                      <a:solidFill>
+                        <a:srgbClr val="DFE2E5"/>
+                      </a:solidFill>
+                      <a:prstDash val="solid"/>
+                      <a:round/>
+                      <a:headEnd type="none" w="med" len="med"/>
+                      <a:tailEnd type="none" w="med" len="med"/>
+                    </a:lnR>
+                    <a:lnT w="12700" cap="flat" cmpd="sng" algn="ctr">
+                      <a:solidFill>
+                        <a:srgbClr val="DFE2E5"/>
+                      </a:solidFill>
+                      <a:prstDash val="solid"/>
+                      <a:round/>
+                      <a:headEnd type="none" w="med" len="med"/>
+                      <a:tailEnd type="none" w="med" len="med"/>
+                    </a:lnT>
+                    <a:lnB w="12700" cap="flat" cmpd="sng" algn="ctr">
+                      <a:solidFill>
+                        <a:srgbClr val="DFE2E5"/>
+                      </a:solidFill>
+                      <a:prstDash val="solid"/>
+                      <a:round/>
+                      <a:headEnd type="none" w="med" len="med"/>
+                      <a:tailEnd type="none" w="med" len="med"/>
+                    </a:lnB>
+                    <a:solidFill>
+                      <a:srgbClr val="F6F8FA"/>
+                    </a:solidFill>
+                  </a:tcPr>
+                </a:tc>
+                <a:tc>
+                  <a:txBody>
+                    <a:bodyPr/>
+                    <a:lstStyle/>
+                    <a:p>
+                      <a:pPr marL="0" marR="0" lvl="0" indent="0" algn="l" defTabSz="457200" rtl="0" eaLnBrk="1" fontAlgn="ctr" latinLnBrk="0" hangingPunct="1">
+                        <a:lnSpc>
+                          <a:spcPct val="100000"/>
+                        </a:lnSpc>
+                        <a:spcBef>
+                          <a:spcPts val="0"/>
+                        </a:spcBef>
+                        <a:spcAft>
+                          <a:spcPts val="0"/>
+                        </a:spcAft>
+                        <a:buClrTx/>
+                        <a:buSzTx/>
+                        <a:buFontTx/>
+                        <a:buNone/>
+                        <a:tabLst/>
+                        <a:defRPr/>
+                      </a:pPr>
                       <a:r>
                         <a:rPr lang="ru-RU" sz="1800" b="0" i="0" u="none" strike="noStrike" dirty="0">
                           <a:solidFill>
@@ -39167,9 +39606,751 @@
                     </a:solidFill>
                   </a:tcPr>
                 </a:tc>
+                <a:tc>
+                  <a:txBody>
+                    <a:bodyPr/>
+                    <a:lstStyle/>
+                    <a:p>
+                      <a:pPr algn="l" fontAlgn="ctr"/>
+                      <a:r>
+                        <a:rPr lang="en-US" sz="1800" b="0" i="0" u="none" strike="noStrike" dirty="0" err="1">
+                          <a:solidFill>
+                            <a:srgbClr val="24292E"/>
+                          </a:solidFill>
+                          <a:effectLst/>
+                          <a:latin typeface="Segoe UI" panose="020B0502040204020203" pitchFamily="34" charset="0"/>
+                        </a:rPr>
+                        <a:t>InvoCut</a:t>
+                      </a:r>
+                      <a:endParaRPr lang="ru-RU" sz="1800" b="0" i="0" u="none" strike="noStrike" dirty="0">
+                        <a:solidFill>
+                          <a:srgbClr val="24292E"/>
+                        </a:solidFill>
+                        <a:effectLst/>
+                        <a:latin typeface="Segoe UI" panose="020B0502040204020203" pitchFamily="34" charset="0"/>
+                      </a:endParaRPr>
+                    </a:p>
+                  </a:txBody>
+                  <a:tcPr marL="85725" marR="9525" marT="57150" marB="57150" anchor="ctr">
+                    <a:lnL w="12700" cap="flat" cmpd="sng" algn="ctr">
+                      <a:solidFill>
+                        <a:srgbClr val="DFE2E5"/>
+                      </a:solidFill>
+                      <a:prstDash val="solid"/>
+                      <a:round/>
+                      <a:headEnd type="none" w="med" len="med"/>
+                      <a:tailEnd type="none" w="med" len="med"/>
+                    </a:lnL>
+                    <a:lnR w="12700" cap="flat" cmpd="sng" algn="ctr">
+                      <a:solidFill>
+                        <a:srgbClr val="DFE2E5"/>
+                      </a:solidFill>
+                      <a:prstDash val="solid"/>
+                      <a:round/>
+                      <a:headEnd type="none" w="med" len="med"/>
+                      <a:tailEnd type="none" w="med" len="med"/>
+                    </a:lnR>
+                    <a:lnT w="12700" cap="flat" cmpd="sng" algn="ctr">
+                      <a:solidFill>
+                        <a:srgbClr val="DFE2E5"/>
+                      </a:solidFill>
+                      <a:prstDash val="solid"/>
+                      <a:round/>
+                      <a:headEnd type="none" w="med" len="med"/>
+                      <a:tailEnd type="none" w="med" len="med"/>
+                    </a:lnT>
+                    <a:lnB w="12700" cap="flat" cmpd="sng" algn="ctr">
+                      <a:solidFill>
+                        <a:srgbClr val="DFE2E5"/>
+                      </a:solidFill>
+                      <a:prstDash val="solid"/>
+                      <a:round/>
+                      <a:headEnd type="none" w="med" len="med"/>
+                      <a:tailEnd type="none" w="med" len="med"/>
+                    </a:lnB>
+                    <a:solidFill>
+                      <a:srgbClr val="F6F8FA"/>
+                    </a:solidFill>
+                  </a:tcPr>
+                </a:tc>
                 <a:extLst>
                   <a:ext uri="{0D108BD9-81ED-4DB2-BD59-A6C34878D82A}">
-                    <a16:rowId xmlns:a16="http://schemas.microsoft.com/office/drawing/2014/main" val="1787466719"/>
+                    <a16:rowId xmlns:a16="http://schemas.microsoft.com/office/drawing/2014/main" val="3737518074"/>
+                  </a:ext>
+                </a:extLst>
+              </a:tr>
+              <a:tr h="302186">
+                <a:tc>
+                  <a:txBody>
+                    <a:bodyPr/>
+                    <a:lstStyle/>
+                    <a:p>
+                      <a:pPr algn="l" fontAlgn="ctr"/>
+                      <a:r>
+                        <a:rPr lang="en-US" sz="1800" b="0" i="0" u="none" strike="noStrike" dirty="0">
+                          <a:solidFill>
+                            <a:srgbClr val="24292E"/>
+                          </a:solidFill>
+                          <a:effectLst/>
+                          <a:latin typeface="Segoe UI" panose="020B0502040204020203" pitchFamily="34" charset="0"/>
+                        </a:rPr>
+                        <a:t>InvoR04</a:t>
+                      </a:r>
+                    </a:p>
+                  </a:txBody>
+                  <a:tcPr marL="85725" marR="9525" marT="57150" marB="57150" anchor="ctr">
+                    <a:lnL w="12700" cap="flat" cmpd="sng" algn="ctr">
+                      <a:solidFill>
+                        <a:srgbClr val="DFE2E5"/>
+                      </a:solidFill>
+                      <a:prstDash val="solid"/>
+                      <a:round/>
+                      <a:headEnd type="none" w="med" len="med"/>
+                      <a:tailEnd type="none" w="med" len="med"/>
+                    </a:lnL>
+                    <a:lnR w="12700" cap="flat" cmpd="sng" algn="ctr">
+                      <a:solidFill>
+                        <a:srgbClr val="DFE2E5"/>
+                      </a:solidFill>
+                      <a:prstDash val="solid"/>
+                      <a:round/>
+                      <a:headEnd type="none" w="med" len="med"/>
+                      <a:tailEnd type="none" w="med" len="med"/>
+                    </a:lnR>
+                    <a:lnT w="12700" cap="flat" cmpd="sng" algn="ctr">
+                      <a:solidFill>
+                        <a:srgbClr val="DFE2E5"/>
+                      </a:solidFill>
+                      <a:prstDash val="solid"/>
+                      <a:round/>
+                      <a:headEnd type="none" w="med" len="med"/>
+                      <a:tailEnd type="none" w="med" len="med"/>
+                    </a:lnT>
+                    <a:lnB w="12700" cap="flat" cmpd="sng" algn="ctr">
+                      <a:solidFill>
+                        <a:srgbClr val="DFE2E5"/>
+                      </a:solidFill>
+                      <a:prstDash val="solid"/>
+                      <a:round/>
+                      <a:headEnd type="none" w="med" len="med"/>
+                      <a:tailEnd type="none" w="med" len="med"/>
+                    </a:lnB>
+                    <a:solidFill>
+                      <a:srgbClr val="F6F8FA"/>
+                    </a:solidFill>
+                  </a:tcPr>
+                </a:tc>
+                <a:tc>
+                  <a:txBody>
+                    <a:bodyPr/>
+                    <a:lstStyle/>
+                    <a:p>
+                      <a:pPr algn="l" fontAlgn="ctr"/>
+                      <a:r>
+                        <a:rPr lang="ru-RU" sz="1800" b="0" i="0" u="none" strike="noStrike" dirty="0">
+                          <a:solidFill>
+                            <a:srgbClr val="24292E"/>
+                          </a:solidFill>
+                          <a:effectLst/>
+                          <a:latin typeface="Segoe UI" panose="020B0502040204020203" pitchFamily="34" charset="0"/>
+                        </a:rPr>
+                        <a:t>4  кратная реплика </a:t>
+                      </a:r>
+                      <a:r>
+                        <a:rPr lang="en-US" sz="1800" b="0" i="0" u="none" strike="noStrike" dirty="0" err="1">
+                          <a:solidFill>
+                            <a:srgbClr val="24292E"/>
+                          </a:solidFill>
+                          <a:effectLst/>
+                          <a:latin typeface="Segoe UI" panose="020B0502040204020203" pitchFamily="34" charset="0"/>
+                        </a:rPr>
+                        <a:t>InvoCut</a:t>
+                      </a:r>
+                      <a:endParaRPr lang="ru-RU" sz="1800" b="0" i="0" u="none" strike="noStrike" dirty="0">
+                        <a:solidFill>
+                          <a:srgbClr val="24292E"/>
+                        </a:solidFill>
+                        <a:effectLst/>
+                        <a:latin typeface="Segoe UI" panose="020B0502040204020203" pitchFamily="34" charset="0"/>
+                      </a:endParaRPr>
+                    </a:p>
+                  </a:txBody>
+                  <a:tcPr marL="85725" marR="9525" marT="57150" marB="57150" anchor="ctr">
+                    <a:lnL w="12700" cap="flat" cmpd="sng" algn="ctr">
+                      <a:solidFill>
+                        <a:srgbClr val="DFE2E5"/>
+                      </a:solidFill>
+                      <a:prstDash val="solid"/>
+                      <a:round/>
+                      <a:headEnd type="none" w="med" len="med"/>
+                      <a:tailEnd type="none" w="med" len="med"/>
+                    </a:lnL>
+                    <a:lnR w="12700" cap="flat" cmpd="sng" algn="ctr">
+                      <a:solidFill>
+                        <a:srgbClr val="DFE2E5"/>
+                      </a:solidFill>
+                      <a:prstDash val="solid"/>
+                      <a:round/>
+                      <a:headEnd type="none" w="med" len="med"/>
+                      <a:tailEnd type="none" w="med" len="med"/>
+                    </a:lnR>
+                    <a:lnT w="12700" cap="flat" cmpd="sng" algn="ctr">
+                      <a:solidFill>
+                        <a:srgbClr val="DFE2E5"/>
+                      </a:solidFill>
+                      <a:prstDash val="solid"/>
+                      <a:round/>
+                      <a:headEnd type="none" w="med" len="med"/>
+                      <a:tailEnd type="none" w="med" len="med"/>
+                    </a:lnT>
+                    <a:lnB w="12700" cap="flat" cmpd="sng" algn="ctr">
+                      <a:solidFill>
+                        <a:srgbClr val="DFE2E5"/>
+                      </a:solidFill>
+                      <a:prstDash val="solid"/>
+                      <a:round/>
+                      <a:headEnd type="none" w="med" len="med"/>
+                      <a:tailEnd type="none" w="med" len="med"/>
+                    </a:lnB>
+                    <a:solidFill>
+                      <a:srgbClr val="F6F8FA"/>
+                    </a:solidFill>
+                  </a:tcPr>
+                </a:tc>
+                <a:tc>
+                  <a:txBody>
+                    <a:bodyPr/>
+                    <a:lstStyle/>
+                    <a:p>
+                      <a:pPr algn="l" fontAlgn="ctr"/>
+                      <a:r>
+                        <a:rPr lang="en-US" sz="1800" b="0" i="0" u="none" strike="noStrike" dirty="0" err="1">
+                          <a:solidFill>
+                            <a:srgbClr val="24292E"/>
+                          </a:solidFill>
+                          <a:effectLst/>
+                          <a:latin typeface="Segoe UI" panose="020B0502040204020203" pitchFamily="34" charset="0"/>
+                        </a:rPr>
+                        <a:t>InvoCut</a:t>
+                      </a:r>
+                      <a:endParaRPr lang="ru-RU" sz="1800" b="0" i="0" u="none" strike="noStrike" dirty="0">
+                        <a:solidFill>
+                          <a:srgbClr val="24292E"/>
+                        </a:solidFill>
+                        <a:effectLst/>
+                        <a:latin typeface="Segoe UI" panose="020B0502040204020203" pitchFamily="34" charset="0"/>
+                      </a:endParaRPr>
+                    </a:p>
+                  </a:txBody>
+                  <a:tcPr marL="85725" marR="9525" marT="57150" marB="57150" anchor="ctr">
+                    <a:lnL w="12700" cap="flat" cmpd="sng" algn="ctr">
+                      <a:solidFill>
+                        <a:srgbClr val="DFE2E5"/>
+                      </a:solidFill>
+                      <a:prstDash val="solid"/>
+                      <a:round/>
+                      <a:headEnd type="none" w="med" len="med"/>
+                      <a:tailEnd type="none" w="med" len="med"/>
+                    </a:lnL>
+                    <a:lnR w="12700" cap="flat" cmpd="sng" algn="ctr">
+                      <a:solidFill>
+                        <a:srgbClr val="DFE2E5"/>
+                      </a:solidFill>
+                      <a:prstDash val="solid"/>
+                      <a:round/>
+                      <a:headEnd type="none" w="med" len="med"/>
+                      <a:tailEnd type="none" w="med" len="med"/>
+                    </a:lnR>
+                    <a:lnT w="12700" cap="flat" cmpd="sng" algn="ctr">
+                      <a:solidFill>
+                        <a:srgbClr val="DFE2E5"/>
+                      </a:solidFill>
+                      <a:prstDash val="solid"/>
+                      <a:round/>
+                      <a:headEnd type="none" w="med" len="med"/>
+                      <a:tailEnd type="none" w="med" len="med"/>
+                    </a:lnT>
+                    <a:lnB w="12700" cap="flat" cmpd="sng" algn="ctr">
+                      <a:solidFill>
+                        <a:srgbClr val="DFE2E5"/>
+                      </a:solidFill>
+                      <a:prstDash val="solid"/>
+                      <a:round/>
+                      <a:headEnd type="none" w="med" len="med"/>
+                      <a:tailEnd type="none" w="med" len="med"/>
+                    </a:lnB>
+                    <a:solidFill>
+                      <a:srgbClr val="F6F8FA"/>
+                    </a:solidFill>
+                  </a:tcPr>
+                </a:tc>
+                <a:extLst>
+                  <a:ext uri="{0D108BD9-81ED-4DB2-BD59-A6C34878D82A}">
+                    <a16:rowId xmlns:a16="http://schemas.microsoft.com/office/drawing/2014/main" val="836594189"/>
+                  </a:ext>
+                </a:extLst>
+              </a:tr>
+              <a:tr h="302186">
+                <a:tc>
+                  <a:txBody>
+                    <a:bodyPr/>
+                    <a:lstStyle/>
+                    <a:p>
+                      <a:pPr algn="l" fontAlgn="ctr"/>
+                      <a:r>
+                        <a:rPr lang="en-US" sz="1800" b="0" i="0" u="none" strike="noStrike" dirty="0">
+                          <a:solidFill>
+                            <a:srgbClr val="24292E"/>
+                          </a:solidFill>
+                          <a:effectLst/>
+                          <a:latin typeface="Segoe UI" panose="020B0502040204020203" pitchFamily="34" charset="0"/>
+                        </a:rPr>
+                        <a:t>InvoR08</a:t>
+                      </a:r>
+                    </a:p>
+                  </a:txBody>
+                  <a:tcPr marL="85725" marR="9525" marT="57150" marB="57150" anchor="ctr">
+                    <a:lnL w="12700" cap="flat" cmpd="sng" algn="ctr">
+                      <a:solidFill>
+                        <a:srgbClr val="DFE2E5"/>
+                      </a:solidFill>
+                      <a:prstDash val="solid"/>
+                      <a:round/>
+                      <a:headEnd type="none" w="med" len="med"/>
+                      <a:tailEnd type="none" w="med" len="med"/>
+                    </a:lnL>
+                    <a:lnR w="12700" cap="flat" cmpd="sng" algn="ctr">
+                      <a:solidFill>
+                        <a:srgbClr val="DFE2E5"/>
+                      </a:solidFill>
+                      <a:prstDash val="solid"/>
+                      <a:round/>
+                      <a:headEnd type="none" w="med" len="med"/>
+                      <a:tailEnd type="none" w="med" len="med"/>
+                    </a:lnR>
+                    <a:lnT w="12700" cap="flat" cmpd="sng" algn="ctr">
+                      <a:solidFill>
+                        <a:srgbClr val="DFE2E5"/>
+                      </a:solidFill>
+                      <a:prstDash val="solid"/>
+                      <a:round/>
+                      <a:headEnd type="none" w="med" len="med"/>
+                      <a:tailEnd type="none" w="med" len="med"/>
+                    </a:lnT>
+                    <a:lnB w="12700" cap="flat" cmpd="sng" algn="ctr">
+                      <a:solidFill>
+                        <a:srgbClr val="DFE2E5"/>
+                      </a:solidFill>
+                      <a:prstDash val="solid"/>
+                      <a:round/>
+                      <a:headEnd type="none" w="med" len="med"/>
+                      <a:tailEnd type="none" w="med" len="med"/>
+                    </a:lnB>
+                    <a:solidFill>
+                      <a:srgbClr val="F6F8FA"/>
+                    </a:solidFill>
+                  </a:tcPr>
+                </a:tc>
+                <a:tc>
+                  <a:txBody>
+                    <a:bodyPr/>
+                    <a:lstStyle/>
+                    <a:p>
+                      <a:pPr marL="0" marR="0" lvl="0" indent="0" algn="l" defTabSz="457200" rtl="0" eaLnBrk="1" fontAlgn="ctr" latinLnBrk="0" hangingPunct="1">
+                        <a:lnSpc>
+                          <a:spcPct val="100000"/>
+                        </a:lnSpc>
+                        <a:spcBef>
+                          <a:spcPts val="0"/>
+                        </a:spcBef>
+                        <a:spcAft>
+                          <a:spcPts val="0"/>
+                        </a:spcAft>
+                        <a:buClrTx/>
+                        <a:buSzTx/>
+                        <a:buFontTx/>
+                        <a:buNone/>
+                        <a:tabLst/>
+                        <a:defRPr/>
+                      </a:pPr>
+                      <a:r>
+                        <a:rPr lang="ru-RU" sz="1800" b="0" i="0" u="none" strike="noStrike" dirty="0">
+                          <a:solidFill>
+                            <a:srgbClr val="24292E"/>
+                          </a:solidFill>
+                          <a:effectLst/>
+                          <a:latin typeface="Segoe UI" panose="020B0502040204020203" pitchFamily="34" charset="0"/>
+                        </a:rPr>
+                        <a:t>8  кратная реплика </a:t>
+                      </a:r>
+                      <a:r>
+                        <a:rPr lang="en-US" sz="1800" b="0" i="0" u="none" strike="noStrike" dirty="0" err="1">
+                          <a:solidFill>
+                            <a:srgbClr val="24292E"/>
+                          </a:solidFill>
+                          <a:effectLst/>
+                          <a:latin typeface="Segoe UI" panose="020B0502040204020203" pitchFamily="34" charset="0"/>
+                        </a:rPr>
+                        <a:t>InvoCut</a:t>
+                      </a:r>
+                      <a:endParaRPr lang="ru-RU" sz="1800" b="0" i="0" u="none" strike="noStrike" dirty="0">
+                        <a:solidFill>
+                          <a:srgbClr val="24292E"/>
+                        </a:solidFill>
+                        <a:effectLst/>
+                        <a:latin typeface="Segoe UI" panose="020B0502040204020203" pitchFamily="34" charset="0"/>
+                      </a:endParaRPr>
+                    </a:p>
+                  </a:txBody>
+                  <a:tcPr marL="85725" marR="9525" marT="57150" marB="57150" anchor="ctr">
+                    <a:lnL w="12700" cap="flat" cmpd="sng" algn="ctr">
+                      <a:solidFill>
+                        <a:srgbClr val="DFE2E5"/>
+                      </a:solidFill>
+                      <a:prstDash val="solid"/>
+                      <a:round/>
+                      <a:headEnd type="none" w="med" len="med"/>
+                      <a:tailEnd type="none" w="med" len="med"/>
+                    </a:lnL>
+                    <a:lnR w="12700" cap="flat" cmpd="sng" algn="ctr">
+                      <a:solidFill>
+                        <a:srgbClr val="DFE2E5"/>
+                      </a:solidFill>
+                      <a:prstDash val="solid"/>
+                      <a:round/>
+                      <a:headEnd type="none" w="med" len="med"/>
+                      <a:tailEnd type="none" w="med" len="med"/>
+                    </a:lnR>
+                    <a:lnT w="12700" cap="flat" cmpd="sng" algn="ctr">
+                      <a:solidFill>
+                        <a:srgbClr val="DFE2E5"/>
+                      </a:solidFill>
+                      <a:prstDash val="solid"/>
+                      <a:round/>
+                      <a:headEnd type="none" w="med" len="med"/>
+                      <a:tailEnd type="none" w="med" len="med"/>
+                    </a:lnT>
+                    <a:lnB w="12700" cap="flat" cmpd="sng" algn="ctr">
+                      <a:solidFill>
+                        <a:srgbClr val="DFE2E5"/>
+                      </a:solidFill>
+                      <a:prstDash val="solid"/>
+                      <a:round/>
+                      <a:headEnd type="none" w="med" len="med"/>
+                      <a:tailEnd type="none" w="med" len="med"/>
+                    </a:lnB>
+                    <a:solidFill>
+                      <a:srgbClr val="F6F8FA"/>
+                    </a:solidFill>
+                  </a:tcPr>
+                </a:tc>
+                <a:tc>
+                  <a:txBody>
+                    <a:bodyPr/>
+                    <a:lstStyle/>
+                    <a:p>
+                      <a:pPr algn="l" fontAlgn="ctr"/>
+                      <a:r>
+                        <a:rPr lang="en-US" sz="1800" b="0" i="0" u="none" strike="noStrike" dirty="0" err="1">
+                          <a:solidFill>
+                            <a:srgbClr val="24292E"/>
+                          </a:solidFill>
+                          <a:effectLst/>
+                          <a:latin typeface="Segoe UI" panose="020B0502040204020203" pitchFamily="34" charset="0"/>
+                        </a:rPr>
+                        <a:t>InvoCut</a:t>
+                      </a:r>
+                      <a:endParaRPr lang="ru-RU" sz="1800" b="0" i="0" u="none" strike="noStrike" dirty="0">
+                        <a:solidFill>
+                          <a:srgbClr val="24292E"/>
+                        </a:solidFill>
+                        <a:effectLst/>
+                        <a:latin typeface="Segoe UI" panose="020B0502040204020203" pitchFamily="34" charset="0"/>
+                      </a:endParaRPr>
+                    </a:p>
+                  </a:txBody>
+                  <a:tcPr marL="85725" marR="9525" marT="57150" marB="57150" anchor="ctr">
+                    <a:lnL w="12700" cap="flat" cmpd="sng" algn="ctr">
+                      <a:solidFill>
+                        <a:srgbClr val="DFE2E5"/>
+                      </a:solidFill>
+                      <a:prstDash val="solid"/>
+                      <a:round/>
+                      <a:headEnd type="none" w="med" len="med"/>
+                      <a:tailEnd type="none" w="med" len="med"/>
+                    </a:lnL>
+                    <a:lnR w="12700" cap="flat" cmpd="sng" algn="ctr">
+                      <a:solidFill>
+                        <a:srgbClr val="DFE2E5"/>
+                      </a:solidFill>
+                      <a:prstDash val="solid"/>
+                      <a:round/>
+                      <a:headEnd type="none" w="med" len="med"/>
+                      <a:tailEnd type="none" w="med" len="med"/>
+                    </a:lnR>
+                    <a:lnT w="12700" cap="flat" cmpd="sng" algn="ctr">
+                      <a:solidFill>
+                        <a:srgbClr val="DFE2E5"/>
+                      </a:solidFill>
+                      <a:prstDash val="solid"/>
+                      <a:round/>
+                      <a:headEnd type="none" w="med" len="med"/>
+                      <a:tailEnd type="none" w="med" len="med"/>
+                    </a:lnT>
+                    <a:lnB w="12700" cap="flat" cmpd="sng" algn="ctr">
+                      <a:solidFill>
+                        <a:srgbClr val="DFE2E5"/>
+                      </a:solidFill>
+                      <a:prstDash val="solid"/>
+                      <a:round/>
+                      <a:headEnd type="none" w="med" len="med"/>
+                      <a:tailEnd type="none" w="med" len="med"/>
+                    </a:lnB>
+                    <a:solidFill>
+                      <a:srgbClr val="F6F8FA"/>
+                    </a:solidFill>
+                  </a:tcPr>
+                </a:tc>
+                <a:extLst>
+                  <a:ext uri="{0D108BD9-81ED-4DB2-BD59-A6C34878D82A}">
+                    <a16:rowId xmlns:a16="http://schemas.microsoft.com/office/drawing/2014/main" val="3347303188"/>
+                  </a:ext>
+                </a:extLst>
+              </a:tr>
+              <a:tr h="302186">
+                <a:tc>
+                  <a:txBody>
+                    <a:bodyPr/>
+                    <a:lstStyle/>
+                    <a:p>
+                      <a:pPr algn="l" fontAlgn="ctr"/>
+                      <a:r>
+                        <a:rPr lang="en-US" sz="1800" b="0" i="0" u="none" strike="noStrike" dirty="0">
+                          <a:solidFill>
+                            <a:srgbClr val="24292E"/>
+                          </a:solidFill>
+                          <a:effectLst/>
+                          <a:latin typeface="Segoe UI" panose="020B0502040204020203" pitchFamily="34" charset="0"/>
+                        </a:rPr>
+                        <a:t>InvoR16</a:t>
+                      </a:r>
+                    </a:p>
+                  </a:txBody>
+                  <a:tcPr marL="85725" marR="9525" marT="57150" marB="57150" anchor="ctr">
+                    <a:lnL w="12700" cap="flat" cmpd="sng" algn="ctr">
+                      <a:solidFill>
+                        <a:srgbClr val="DFE2E5"/>
+                      </a:solidFill>
+                      <a:prstDash val="solid"/>
+                      <a:round/>
+                      <a:headEnd type="none" w="med" len="med"/>
+                      <a:tailEnd type="none" w="med" len="med"/>
+                    </a:lnL>
+                    <a:lnR w="12700" cap="flat" cmpd="sng" algn="ctr">
+                      <a:solidFill>
+                        <a:srgbClr val="DFE2E5"/>
+                      </a:solidFill>
+                      <a:prstDash val="solid"/>
+                      <a:round/>
+                      <a:headEnd type="none" w="med" len="med"/>
+                      <a:tailEnd type="none" w="med" len="med"/>
+                    </a:lnR>
+                    <a:lnT w="12700" cap="flat" cmpd="sng" algn="ctr">
+                      <a:solidFill>
+                        <a:srgbClr val="DFE2E5"/>
+                      </a:solidFill>
+                      <a:prstDash val="solid"/>
+                      <a:round/>
+                      <a:headEnd type="none" w="med" len="med"/>
+                      <a:tailEnd type="none" w="med" len="med"/>
+                    </a:lnT>
+                    <a:lnB w="12700" cap="flat" cmpd="sng" algn="ctr">
+                      <a:solidFill>
+                        <a:srgbClr val="DFE2E5"/>
+                      </a:solidFill>
+                      <a:prstDash val="solid"/>
+                      <a:round/>
+                      <a:headEnd type="none" w="med" len="med"/>
+                      <a:tailEnd type="none" w="med" len="med"/>
+                    </a:lnB>
+                    <a:solidFill>
+                      <a:srgbClr val="F6F8FA"/>
+                    </a:solidFill>
+                  </a:tcPr>
+                </a:tc>
+                <a:tc>
+                  <a:txBody>
+                    <a:bodyPr/>
+                    <a:lstStyle/>
+                    <a:p>
+                      <a:pPr marL="0" marR="0" lvl="0" indent="0" algn="l" defTabSz="457200" rtl="0" eaLnBrk="1" fontAlgn="ctr" latinLnBrk="0" hangingPunct="1">
+                        <a:lnSpc>
+                          <a:spcPct val="100000"/>
+                        </a:lnSpc>
+                        <a:spcBef>
+                          <a:spcPts val="0"/>
+                        </a:spcBef>
+                        <a:spcAft>
+                          <a:spcPts val="0"/>
+                        </a:spcAft>
+                        <a:buClrTx/>
+                        <a:buSzTx/>
+                        <a:buFontTx/>
+                        <a:buNone/>
+                        <a:tabLst/>
+                        <a:defRPr/>
+                      </a:pPr>
+                      <a:r>
+                        <a:rPr lang="en-US" sz="1800" b="0" i="0" u="none" strike="noStrike" dirty="0">
+                          <a:solidFill>
+                            <a:srgbClr val="24292E"/>
+                          </a:solidFill>
+                          <a:effectLst/>
+                          <a:latin typeface="Segoe UI" panose="020B0502040204020203" pitchFamily="34" charset="0"/>
+                        </a:rPr>
+                        <a:t>16</a:t>
+                      </a:r>
+                      <a:r>
+                        <a:rPr lang="ru-RU" sz="1800" b="0" i="0" u="none" strike="noStrike" dirty="0">
+                          <a:solidFill>
+                            <a:srgbClr val="24292E"/>
+                          </a:solidFill>
+                          <a:effectLst/>
+                          <a:latin typeface="Segoe UI" panose="020B0502040204020203" pitchFamily="34" charset="0"/>
+                        </a:rPr>
+                        <a:t> кратная реплика </a:t>
+                      </a:r>
+                      <a:r>
+                        <a:rPr lang="en-US" sz="1800" b="0" i="0" u="none" strike="noStrike" dirty="0" err="1">
+                          <a:solidFill>
+                            <a:srgbClr val="24292E"/>
+                          </a:solidFill>
+                          <a:effectLst/>
+                          <a:latin typeface="Segoe UI" panose="020B0502040204020203" pitchFamily="34" charset="0"/>
+                        </a:rPr>
+                        <a:t>InvoCut</a:t>
+                      </a:r>
+                      <a:endParaRPr lang="ru-RU" sz="1800" b="0" i="0" u="none" strike="noStrike" dirty="0">
+                        <a:solidFill>
+                          <a:srgbClr val="24292E"/>
+                        </a:solidFill>
+                        <a:effectLst/>
+                        <a:latin typeface="Segoe UI" panose="020B0502040204020203" pitchFamily="34" charset="0"/>
+                      </a:endParaRPr>
+                    </a:p>
+                  </a:txBody>
+                  <a:tcPr marL="85725" marR="9525" marT="57150" marB="57150" anchor="ctr">
+                    <a:lnL w="12700" cap="flat" cmpd="sng" algn="ctr">
+                      <a:solidFill>
+                        <a:srgbClr val="DFE2E5"/>
+                      </a:solidFill>
+                      <a:prstDash val="solid"/>
+                      <a:round/>
+                      <a:headEnd type="none" w="med" len="med"/>
+                      <a:tailEnd type="none" w="med" len="med"/>
+                    </a:lnL>
+                    <a:lnR w="12700" cap="flat" cmpd="sng" algn="ctr">
+                      <a:solidFill>
+                        <a:srgbClr val="DFE2E5"/>
+                      </a:solidFill>
+                      <a:prstDash val="solid"/>
+                      <a:round/>
+                      <a:headEnd type="none" w="med" len="med"/>
+                      <a:tailEnd type="none" w="med" len="med"/>
+                    </a:lnR>
+                    <a:lnT w="12700" cap="flat" cmpd="sng" algn="ctr">
+                      <a:solidFill>
+                        <a:srgbClr val="DFE2E5"/>
+                      </a:solidFill>
+                      <a:prstDash val="solid"/>
+                      <a:round/>
+                      <a:headEnd type="none" w="med" len="med"/>
+                      <a:tailEnd type="none" w="med" len="med"/>
+                    </a:lnT>
+                    <a:lnB w="12700" cap="flat" cmpd="sng" algn="ctr">
+                      <a:solidFill>
+                        <a:srgbClr val="DFE2E5"/>
+                      </a:solidFill>
+                      <a:prstDash val="solid"/>
+                      <a:round/>
+                      <a:headEnd type="none" w="med" len="med"/>
+                      <a:tailEnd type="none" w="med" len="med"/>
+                    </a:lnB>
+                    <a:solidFill>
+                      <a:srgbClr val="F6F8FA"/>
+                    </a:solidFill>
+                  </a:tcPr>
+                </a:tc>
+                <a:tc>
+                  <a:txBody>
+                    <a:bodyPr/>
+                    <a:lstStyle/>
+                    <a:p>
+                      <a:pPr algn="l" fontAlgn="ctr"/>
+                      <a:r>
+                        <a:rPr lang="en-US" sz="1800" b="0" i="0" u="none" strike="noStrike" dirty="0" err="1">
+                          <a:solidFill>
+                            <a:srgbClr val="24292E"/>
+                          </a:solidFill>
+                          <a:effectLst/>
+                          <a:latin typeface="Segoe UI" panose="020B0502040204020203" pitchFamily="34" charset="0"/>
+                        </a:rPr>
+                        <a:t>InvoCut</a:t>
+                      </a:r>
+                      <a:endParaRPr lang="ru-RU" sz="1800" b="0" i="0" u="none" strike="noStrike" dirty="0">
+                        <a:solidFill>
+                          <a:srgbClr val="24292E"/>
+                        </a:solidFill>
+                        <a:effectLst/>
+                        <a:latin typeface="Segoe UI" panose="020B0502040204020203" pitchFamily="34" charset="0"/>
+                      </a:endParaRPr>
+                    </a:p>
+                  </a:txBody>
+                  <a:tcPr marL="85725" marR="9525" marT="57150" marB="57150" anchor="ctr">
+                    <a:lnL w="12700" cap="flat" cmpd="sng" algn="ctr">
+                      <a:solidFill>
+                        <a:srgbClr val="DFE2E5"/>
+                      </a:solidFill>
+                      <a:prstDash val="solid"/>
+                      <a:round/>
+                      <a:headEnd type="none" w="med" len="med"/>
+                      <a:tailEnd type="none" w="med" len="med"/>
+                    </a:lnL>
+                    <a:lnR w="12700" cap="flat" cmpd="sng" algn="ctr">
+                      <a:solidFill>
+                        <a:srgbClr val="DFE2E5"/>
+                      </a:solidFill>
+                      <a:prstDash val="solid"/>
+                      <a:round/>
+                      <a:headEnd type="none" w="med" len="med"/>
+                      <a:tailEnd type="none" w="med" len="med"/>
+                    </a:lnR>
+                    <a:lnT w="12700" cap="flat" cmpd="sng" algn="ctr">
+                      <a:solidFill>
+                        <a:srgbClr val="DFE2E5"/>
+                      </a:solidFill>
+                      <a:prstDash val="solid"/>
+                      <a:round/>
+                      <a:headEnd type="none" w="med" len="med"/>
+                      <a:tailEnd type="none" w="med" len="med"/>
+                    </a:lnT>
+                    <a:lnB w="12700" cap="flat" cmpd="sng" algn="ctr">
+                      <a:solidFill>
+                        <a:srgbClr val="DFE2E5"/>
+                      </a:solidFill>
+                      <a:prstDash val="solid"/>
+                      <a:round/>
+                      <a:headEnd type="none" w="med" len="med"/>
+                      <a:tailEnd type="none" w="med" len="med"/>
+                    </a:lnB>
+                    <a:solidFill>
+                      <a:srgbClr val="F6F8FA"/>
+                    </a:solidFill>
+                  </a:tcPr>
+                </a:tc>
+                <a:extLst>
+                  <a:ext uri="{0D108BD9-81ED-4DB2-BD59-A6C34878D82A}">
+                    <a16:rowId xmlns:a16="http://schemas.microsoft.com/office/drawing/2014/main" val="3843745806"/>
                   </a:ext>
                 </a:extLst>
               </a:tr>

</xml_diff>